<commit_message>
remove "all" category from Fig S1 PCAs
</commit_message>
<xml_diff>
--- a/paper_figures/fig_s1.pptx
+++ b/paper_figures/fig_s1.pptx
@@ -243,7 +243,7 @@
           <a:p>
             <a:fld id="{204810FE-DF3F-4248-AC84-231497F3E056}" type="datetimeFigureOut">
               <a:rPr lang="en-US" smtClean="0"/>
-              <a:t>11/8/22</a:t>
+              <a:t>11/15/22</a:t>
             </a:fld>
             <a:endParaRPr lang="en-US"/>
           </a:p>
@@ -413,7 +413,7 @@
           <a:p>
             <a:fld id="{204810FE-DF3F-4248-AC84-231497F3E056}" type="datetimeFigureOut">
               <a:rPr lang="en-US" smtClean="0"/>
-              <a:t>11/8/22</a:t>
+              <a:t>11/15/22</a:t>
             </a:fld>
             <a:endParaRPr lang="en-US"/>
           </a:p>
@@ -593,7 +593,7 @@
           <a:p>
             <a:fld id="{204810FE-DF3F-4248-AC84-231497F3E056}" type="datetimeFigureOut">
               <a:rPr lang="en-US" smtClean="0"/>
-              <a:t>11/8/22</a:t>
+              <a:t>11/15/22</a:t>
             </a:fld>
             <a:endParaRPr lang="en-US"/>
           </a:p>
@@ -763,7 +763,7 @@
           <a:p>
             <a:fld id="{204810FE-DF3F-4248-AC84-231497F3E056}" type="datetimeFigureOut">
               <a:rPr lang="en-US" smtClean="0"/>
-              <a:t>11/8/22</a:t>
+              <a:t>11/15/22</a:t>
             </a:fld>
             <a:endParaRPr lang="en-US"/>
           </a:p>
@@ -1007,7 +1007,7 @@
           <a:p>
             <a:fld id="{204810FE-DF3F-4248-AC84-231497F3E056}" type="datetimeFigureOut">
               <a:rPr lang="en-US" smtClean="0"/>
-              <a:t>11/8/22</a:t>
+              <a:t>11/15/22</a:t>
             </a:fld>
             <a:endParaRPr lang="en-US"/>
           </a:p>
@@ -1239,7 +1239,7 @@
           <a:p>
             <a:fld id="{204810FE-DF3F-4248-AC84-231497F3E056}" type="datetimeFigureOut">
               <a:rPr lang="en-US" smtClean="0"/>
-              <a:t>11/8/22</a:t>
+              <a:t>11/15/22</a:t>
             </a:fld>
             <a:endParaRPr lang="en-US"/>
           </a:p>
@@ -1606,7 +1606,7 @@
           <a:p>
             <a:fld id="{204810FE-DF3F-4248-AC84-231497F3E056}" type="datetimeFigureOut">
               <a:rPr lang="en-US" smtClean="0"/>
-              <a:t>11/8/22</a:t>
+              <a:t>11/15/22</a:t>
             </a:fld>
             <a:endParaRPr lang="en-US"/>
           </a:p>
@@ -1724,7 +1724,7 @@
           <a:p>
             <a:fld id="{204810FE-DF3F-4248-AC84-231497F3E056}" type="datetimeFigureOut">
               <a:rPr lang="en-US" smtClean="0"/>
-              <a:t>11/8/22</a:t>
+              <a:t>11/15/22</a:t>
             </a:fld>
             <a:endParaRPr lang="en-US"/>
           </a:p>
@@ -1819,7 +1819,7 @@
           <a:p>
             <a:fld id="{204810FE-DF3F-4248-AC84-231497F3E056}" type="datetimeFigureOut">
               <a:rPr lang="en-US" smtClean="0"/>
-              <a:t>11/8/22</a:t>
+              <a:t>11/15/22</a:t>
             </a:fld>
             <a:endParaRPr lang="en-US"/>
           </a:p>
@@ -2096,7 +2096,7 @@
           <a:p>
             <a:fld id="{204810FE-DF3F-4248-AC84-231497F3E056}" type="datetimeFigureOut">
               <a:rPr lang="en-US" smtClean="0"/>
-              <a:t>11/8/22</a:t>
+              <a:t>11/15/22</a:t>
             </a:fld>
             <a:endParaRPr lang="en-US"/>
           </a:p>
@@ -2353,7 +2353,7 @@
           <a:p>
             <a:fld id="{204810FE-DF3F-4248-AC84-231497F3E056}" type="datetimeFigureOut">
               <a:rPr lang="en-US" smtClean="0"/>
-              <a:t>11/8/22</a:t>
+              <a:t>11/15/22</a:t>
             </a:fld>
             <a:endParaRPr lang="en-US"/>
           </a:p>
@@ -2566,7 +2566,7 @@
           <a:p>
             <a:fld id="{204810FE-DF3F-4248-AC84-231497F3E056}" type="datetimeFigureOut">
               <a:rPr lang="en-US" smtClean="0"/>
-              <a:t>11/8/22</a:t>
+              <a:t>11/15/22</a:t>
             </a:fld>
             <a:endParaRPr lang="en-US"/>
           </a:p>
@@ -3087,10 +3087,10 @@
       </p:sp>
       <p:pic>
         <p:nvPicPr>
-          <p:cNvPr id="3" name="Graphic 2">
+          <p:cNvPr id="4" name="Graphic 3">
             <a:extLst>
               <a:ext uri="{FF2B5EF4-FFF2-40B4-BE49-F238E27FC236}">
-                <a16:creationId xmlns:a16="http://schemas.microsoft.com/office/drawing/2014/main" id="{04A0B2DB-AE64-C5DA-9357-154E743D5809}"/>
+                <a16:creationId xmlns:a16="http://schemas.microsoft.com/office/drawing/2014/main" id="{6D845B18-BB56-A1BF-F309-4D03A5B40A53}"/>
               </a:ext>
             </a:extLst>
           </p:cNvPr>
@@ -3113,8 +3113,8 @@
         </p:blipFill>
         <p:spPr>
           <a:xfrm>
-            <a:off x="133350" y="344844"/>
-            <a:ext cx="4152900" cy="3251200"/>
+            <a:off x="-5018" y="251517"/>
+            <a:ext cx="3987800" cy="3251200"/>
           </a:xfrm>
           <a:prstGeom prst="rect">
             <a:avLst/>
@@ -3123,10 +3123,10 @@
       </p:pic>
       <p:pic>
         <p:nvPicPr>
-          <p:cNvPr id="5" name="Graphic 4">
+          <p:cNvPr id="8" name="Graphic 7">
             <a:extLst>
               <a:ext uri="{FF2B5EF4-FFF2-40B4-BE49-F238E27FC236}">
-                <a16:creationId xmlns:a16="http://schemas.microsoft.com/office/drawing/2014/main" id="{A589126C-FE15-3F0F-E5FA-6EF7C03E90B6}"/>
+                <a16:creationId xmlns:a16="http://schemas.microsoft.com/office/drawing/2014/main" id="{6930F865-924C-5AE5-A648-7DC1FBE612C1}"/>
               </a:ext>
             </a:extLst>
           </p:cNvPr>
@@ -3149,8 +3149,8 @@
         </p:blipFill>
         <p:spPr>
           <a:xfrm>
-            <a:off x="5166783" y="344844"/>
-            <a:ext cx="3467100" cy="3251200"/>
+            <a:off x="5230371" y="251517"/>
+            <a:ext cx="3263900" cy="3251200"/>
           </a:xfrm>
           <a:prstGeom prst="rect">
             <a:avLst/>
@@ -3159,10 +3159,10 @@
       </p:pic>
       <p:pic>
         <p:nvPicPr>
-          <p:cNvPr id="7" name="Graphic 6">
+          <p:cNvPr id="10" name="Graphic 9">
             <a:extLst>
               <a:ext uri="{FF2B5EF4-FFF2-40B4-BE49-F238E27FC236}">
-                <a16:creationId xmlns:a16="http://schemas.microsoft.com/office/drawing/2014/main" id="{DBC95349-B2A5-B491-EAE3-6543B4C40529}"/>
+                <a16:creationId xmlns:a16="http://schemas.microsoft.com/office/drawing/2014/main" id="{20AC2431-E7A8-8498-F8E1-CA03B1FDE0A5}"/>
               </a:ext>
             </a:extLst>
           </p:cNvPr>
@@ -3185,8 +3185,8 @@
         </p:blipFill>
         <p:spPr>
           <a:xfrm>
-            <a:off x="200211" y="4064000"/>
-            <a:ext cx="3810000" cy="3251200"/>
+            <a:off x="274382" y="4015684"/>
+            <a:ext cx="3429000" cy="3251200"/>
           </a:xfrm>
           <a:prstGeom prst="rect">
             <a:avLst/>

</xml_diff>